<commit_message>
Indian startups with emphasis on algorithms
</commit_message>
<xml_diff>
--- a/Slides/2020-Even-DAA-L03-Analysis-Framework.pptx
+++ b/Slides/2020-Even-DAA-L03-Analysis-Framework.pptx
@@ -9277,7 +9277,7 @@
       </p:sp>
       <p:sp>
         <p:nvSpPr>
-          <p:cNvPr id="123" name="So far, efficiency is related to a single run of algorithm.…"/>
+          <p:cNvPr id="123" name="So far, efficiency is related to each step of a single run of algorithm.…"/>
           <p:cNvSpPr txBox="1"/>
           <p:nvPr>
             <p:ph type="body" idx="1"/>
@@ -9298,13 +9298,13 @@
           <a:p>
             <a:pPr/>
             <a:r>
-              <a:t>So far, efficiency is related to a single run of algorithm.</a:t>
+              <a:t>So far, efficiency is related to each step of a single run of algorithm.</a:t>
             </a:r>
           </a:p>
           <a:p>
             <a:pPr/>
             <a:r>
-              <a:t>In some cases, single run can be very expensive, but subsequent run can be much cheaper</a:t>
+              <a:t>In some cases, single run (one step) can be very expensive, but subsequent run (steps) can be much cheaper</a:t>
             </a:r>
           </a:p>
           <a:p>
@@ -10756,7 +10756,7 @@
       </p:sp>
       <p:sp>
         <p:nvSpPr>
-          <p:cNvPr id="135" name="Glove selection: There are 24 gloves in a drawer: 5 pairs of red gloves, 4 pairs of yellow, and 3pairs of green.…"/>
+          <p:cNvPr id="135" name="Glove selection: There are 24 gloves in a drawer: 5 pairs of red gloves, 4 pairs of yellow, and 3 pairs of green.…"/>
           <p:cNvSpPr txBox="1"/>
           <p:nvPr>
             <p:ph type="body" idx="1"/>
@@ -10782,7 +10782,7 @@
               <a:defRPr sz="3000"/>
             </a:pPr>
             <a:r>
-              <a:t>Glove selection: There are 24 gloves in a drawer: 5 pairs of red gloves, 4 pairs of yellow, and 3pairs of green. </a:t>
+              <a:t>Glove selection: There are 24 gloves in a drawer: 5 pairs of red gloves, 4 pairs of yellow, and 3 pairs of green. </a:t>
             </a:r>
           </a:p>
           <a:p>

</xml_diff>